<commit_message>
Added narration for first 5 slides
</commit_message>
<xml_diff>
--- a/Final Presentation.pptx
+++ b/Final Presentation.pptx
@@ -949,7 +949,7 @@
         </p:nvSpPr>
         <p:spPr>
           <a:xfrm>
-            <a:off x="381300" y="685800"/>
+            <a:off x="381000" y="685800"/>
             <a:ext cx="6096000" cy="3429000"/>
           </a:xfrm>
           <a:custGeom>
@@ -1157,7 +1157,7 @@
         </p:nvSpPr>
         <p:spPr>
           <a:xfrm>
-            <a:off x="381300" y="685800"/>
+            <a:off x="381000" y="685800"/>
             <a:ext cx="6096000" cy="3429000"/>
           </a:xfrm>
           <a:custGeom>
@@ -1309,7 +1309,7 @@
         </p:nvSpPr>
         <p:spPr>
           <a:xfrm>
-            <a:off x="381300" y="685800"/>
+            <a:off x="381000" y="685800"/>
             <a:ext cx="6096000" cy="3429000"/>
           </a:xfrm>
           <a:custGeom>
@@ -1413,7 +1413,7 @@
         </p:nvSpPr>
         <p:spPr>
           <a:xfrm>
-            <a:off x="381300" y="685800"/>
+            <a:off x="381000" y="685800"/>
             <a:ext cx="6096000" cy="3429000"/>
           </a:xfrm>
           <a:custGeom>
@@ -7409,14 +7409,14 @@
               <a:buChar char="●"/>
             </a:pPr>
             <a:r>
-              <a:rPr lang="en">
+              <a:rPr lang="en" dirty="0">
                 <a:solidFill>
                   <a:schemeClr val="dk1"/>
                 </a:solidFill>
               </a:rPr>
               <a:t>Further development of tracker metrics could help analyze extensions</a:t>
             </a:r>
-            <a:endParaRPr>
+            <a:endParaRPr dirty="0">
               <a:solidFill>
                 <a:schemeClr val="dk1"/>
               </a:solidFill>
@@ -7437,14 +7437,14 @@
               <a:buChar char="●"/>
             </a:pPr>
             <a:r>
-              <a:rPr lang="en">
+              <a:rPr lang="en" dirty="0">
                 <a:solidFill>
                   <a:schemeClr val="dk1"/>
                 </a:solidFill>
               </a:rPr>
               <a:t>More types of cooperation with tracking companies could be interesting</a:t>
             </a:r>
-            <a:endParaRPr>
+            <a:endParaRPr dirty="0">
               <a:solidFill>
                 <a:schemeClr val="dk1"/>
               </a:solidFill>
@@ -7465,14 +7465,30 @@
               <a:buChar char="●"/>
             </a:pPr>
             <a:r>
-              <a:rPr lang="en">
+              <a:rPr lang="en" dirty="0">
                 <a:solidFill>
                   <a:schemeClr val="dk1"/>
                 </a:solidFill>
               </a:rPr>
               <a:t>Expand investigated websites beyond Alexa Top 50 (i.e. top 1 million)</a:t>
             </a:r>
-            <a:endParaRPr>
+          </a:p>
+          <a:p>
+            <a:pPr lvl="0">
+              <a:buClr>
+                <a:schemeClr val="dk1"/>
+              </a:buClr>
+            </a:pPr>
+            <a:r>
+              <a:rPr lang="en-US" dirty="0">
+                <a:solidFill>
+                  <a:srgbClr val="FFFFFF"/>
+                </a:solidFill>
+                <a:latin typeface="Arial" panose="020B0604020202020204" pitchFamily="34" charset="0"/>
+              </a:rPr>
+              <a:t>Use connectivity as a new metric or analyze connectivity between types of websites (i.e., News, Shopping)</a:t>
+            </a:r>
+            <a:endParaRPr dirty="0">
               <a:solidFill>
                 <a:schemeClr val="dk1"/>
               </a:solidFill>
@@ -7815,14 +7831,14 @@
               <a:buChar char="●"/>
             </a:pPr>
             <a:r>
-              <a:rPr lang="en">
+              <a:rPr lang="en" dirty="0">
                 <a:solidFill>
                   <a:schemeClr val="dk1"/>
                 </a:solidFill>
               </a:rPr>
               <a:t>How are we all tracked?</a:t>
             </a:r>
-            <a:endParaRPr>
+            <a:endParaRPr dirty="0">
               <a:solidFill>
                 <a:schemeClr val="dk1"/>
               </a:solidFill>
@@ -7843,14 +7859,14 @@
               <a:buChar char="○"/>
             </a:pPr>
             <a:r>
-              <a:rPr lang="en">
+              <a:rPr lang="en" dirty="0">
                 <a:solidFill>
                   <a:schemeClr val="dk1"/>
                 </a:solidFill>
               </a:rPr>
               <a:t>Websites and trackers have evolved</a:t>
             </a:r>
-            <a:endParaRPr>
+            <a:endParaRPr dirty="0">
               <a:solidFill>
                 <a:schemeClr val="dk1"/>
               </a:solidFill>
@@ -7871,14 +7887,14 @@
               <a:buChar char="○"/>
             </a:pPr>
             <a:r>
-              <a:rPr lang="en">
+              <a:rPr lang="en" dirty="0">
                 <a:solidFill>
                   <a:schemeClr val="dk1"/>
                 </a:solidFill>
               </a:rPr>
               <a:t>Cookies and trackers are often active without user consent</a:t>
             </a:r>
-            <a:endParaRPr>
+            <a:endParaRPr dirty="0">
               <a:solidFill>
                 <a:schemeClr val="dk1"/>
               </a:solidFill>
@@ -7899,14 +7915,22 @@
               <a:buChar char="●"/>
             </a:pPr>
             <a:r>
-              <a:rPr lang="en">
+              <a:rPr lang="en-US" dirty="0">
                 <a:solidFill>
                   <a:schemeClr val="dk1"/>
                 </a:solidFill>
               </a:rPr>
-              <a:t>What can cookies/trackers track?</a:t>
+              <a:t>How pervasive are trackers on the internet</a:t>
             </a:r>
-            <a:endParaRPr>
+            <a:r>
+              <a:rPr lang="en" dirty="0">
+                <a:solidFill>
+                  <a:schemeClr val="dk1"/>
+                </a:solidFill>
+              </a:rPr>
+              <a:t>?</a:t>
+            </a:r>
+            <a:endParaRPr dirty="0">
               <a:solidFill>
                 <a:schemeClr val="dk1"/>
               </a:solidFill>
@@ -7927,14 +7951,30 @@
               <a:buChar char="○"/>
             </a:pPr>
             <a:r>
-              <a:rPr lang="en">
+              <a:rPr lang="en" dirty="0">
                 <a:solidFill>
                   <a:schemeClr val="dk1"/>
                 </a:solidFill>
               </a:rPr>
-              <a:t>How much information do they collect?</a:t>
+              <a:t>How </a:t>
             </a:r>
-            <a:endParaRPr>
+            <a:r>
+              <a:rPr lang="en-US" dirty="0">
+                <a:solidFill>
+                  <a:schemeClr val="dk1"/>
+                </a:solidFill>
+              </a:rPr>
+              <a:t>likely are specific trackers to be encountered</a:t>
+            </a:r>
+            <a:r>
+              <a:rPr lang="en" dirty="0">
+                <a:solidFill>
+                  <a:schemeClr val="dk1"/>
+                </a:solidFill>
+              </a:rPr>
+              <a:t>?</a:t>
+            </a:r>
+            <a:endParaRPr dirty="0">
               <a:solidFill>
                 <a:schemeClr val="dk1"/>
               </a:solidFill>
@@ -7955,14 +7995,30 @@
               <a:buChar char="○"/>
             </a:pPr>
             <a:r>
-              <a:rPr lang="en">
+              <a:rPr lang="en" dirty="0">
                 <a:solidFill>
                   <a:schemeClr val="dk1"/>
                 </a:solidFill>
               </a:rPr>
-              <a:t>How widespread are trackers?</a:t>
+              <a:t>How widespread are </a:t>
             </a:r>
-            <a:endParaRPr>
+            <a:r>
+              <a:rPr lang="en-US" dirty="0">
+                <a:solidFill>
+                  <a:schemeClr val="dk1"/>
+                </a:solidFill>
+              </a:rPr>
+              <a:t>individual </a:t>
+            </a:r>
+            <a:r>
+              <a:rPr lang="en" dirty="0">
+                <a:solidFill>
+                  <a:schemeClr val="dk1"/>
+                </a:solidFill>
+              </a:rPr>
+              <a:t>trackers?</a:t>
+            </a:r>
+            <a:endParaRPr dirty="0">
               <a:solidFill>
                 <a:schemeClr val="dk1"/>
               </a:solidFill>
@@ -7983,14 +8039,14 @@
               <a:buChar char="●"/>
             </a:pPr>
             <a:r>
-              <a:rPr lang="en">
+              <a:rPr lang="en" dirty="0">
                 <a:solidFill>
                   <a:schemeClr val="dk1"/>
                 </a:solidFill>
               </a:rPr>
               <a:t>What can we do to stop them?</a:t>
             </a:r>
-            <a:endParaRPr>
+            <a:endParaRPr dirty="0">
               <a:solidFill>
                 <a:schemeClr val="dk1"/>
               </a:solidFill>
@@ -8011,14 +8067,22 @@
               <a:buChar char="○"/>
             </a:pPr>
             <a:r>
-              <a:rPr lang="en">
+              <a:rPr lang="en" dirty="0">
                 <a:solidFill>
                   <a:schemeClr val="dk1"/>
                 </a:solidFill>
               </a:rPr>
-              <a:t>Comparison of apps/browsers</a:t>
+              <a:t>Comparison of </a:t>
             </a:r>
-            <a:endParaRPr>
+            <a:r>
+              <a:rPr lang="en-US" dirty="0">
+                <a:solidFill>
+                  <a:schemeClr val="dk1"/>
+                </a:solidFill>
+              </a:rPr>
+              <a:t>public extensions and browsers</a:t>
+            </a:r>
+            <a:endParaRPr dirty="0">
               <a:solidFill>
                 <a:schemeClr val="dk1"/>
               </a:solidFill>
@@ -8168,14 +8232,14 @@
               <a:buChar char="●"/>
             </a:pPr>
             <a:r>
-              <a:rPr lang="en">
+              <a:rPr lang="en" dirty="0">
                 <a:solidFill>
                   <a:schemeClr val="dk1"/>
                 </a:solidFill>
               </a:rPr>
               <a:t>Compare effectiveness of privacy extensions and browsers against trackers on popular sites on the internet</a:t>
             </a:r>
-            <a:endParaRPr>
+            <a:endParaRPr dirty="0">
               <a:solidFill>
                 <a:schemeClr val="dk1"/>
               </a:solidFill>
@@ -8196,14 +8260,22 @@
               <a:buChar char="●"/>
             </a:pPr>
             <a:r>
-              <a:rPr lang="en">
+              <a:rPr lang="en-US" dirty="0">
                 <a:solidFill>
                   <a:schemeClr val="dk1"/>
                 </a:solidFill>
               </a:rPr>
-              <a:t>Employ and test new metric for comparing blocking software</a:t>
+              <a:t>Design and propose </a:t>
             </a:r>
-            <a:endParaRPr>
+            <a:r>
+              <a:rPr lang="en" dirty="0">
+                <a:solidFill>
+                  <a:schemeClr val="dk1"/>
+                </a:solidFill>
+              </a:rPr>
+              <a:t>new metric for comparing blocking software</a:t>
+            </a:r>
+            <a:endParaRPr dirty="0">
               <a:solidFill>
                 <a:schemeClr val="dk1"/>
               </a:solidFill>
@@ -8224,14 +8296,45 @@
               <a:buChar char="●"/>
             </a:pPr>
             <a:r>
-              <a:rPr lang="en">
+              <a:rPr lang="en" dirty="0">
                 <a:solidFill>
                   <a:schemeClr val="dk1"/>
                 </a:solidFill>
               </a:rPr>
               <a:t>Evaluate best blockers for particular users and browsing behavior</a:t>
             </a:r>
-            <a:endParaRPr>
+          </a:p>
+          <a:p>
+            <a:pPr marL="457200" lvl="0" indent="-342900" algn="l" rtl="0">
+              <a:spcBef>
+                <a:spcPts val="0"/>
+              </a:spcBef>
+              <a:spcAft>
+                <a:spcPts val="0"/>
+              </a:spcAft>
+              <a:buClr>
+                <a:schemeClr val="dk1"/>
+              </a:buClr>
+              <a:buSzPts val="1800"/>
+              <a:buChar char="●"/>
+            </a:pPr>
+            <a:r>
+              <a:rPr lang="en" dirty="0">
+                <a:solidFill>
+                  <a:schemeClr val="dk1"/>
+                </a:solidFill>
+              </a:rPr>
+              <a:t>Understand </a:t>
+            </a:r>
+            <a:r>
+              <a:rPr lang="en-US" dirty="0">
+                <a:solidFill>
+                  <a:schemeClr val="dk1"/>
+                </a:solidFill>
+              </a:rPr>
+              <a:t>prevalence of trackers and their presence across websites</a:t>
+            </a:r>
+            <a:endParaRPr dirty="0">
               <a:solidFill>
                 <a:schemeClr val="dk1"/>
               </a:solidFill>
@@ -8465,22 +8568,14 @@
               <a:buChar char="●"/>
             </a:pPr>
             <a:r>
-              <a:rPr lang="en">
+              <a:rPr lang="en" dirty="0">
                 <a:solidFill>
                   <a:schemeClr val="dk1"/>
                 </a:solidFill>
               </a:rPr>
-              <a:t>Best blockers stop prevalent trackers encountered on prominent websites </a:t>
+              <a:t>Best blockers stop prevalent trackers encountered on prominent websites</a:t>
             </a:r>
-            <a:r>
-              <a:rPr lang="en" sz="1200">
-                <a:solidFill>
-                  <a:schemeClr val="dk1"/>
-                </a:solidFill>
-              </a:rPr>
-              <a:t>CITE</a:t>
-            </a:r>
-            <a:endParaRPr sz="1200">
+            <a:endParaRPr sz="1200" dirty="0">
               <a:solidFill>
                 <a:schemeClr val="dk1"/>
               </a:solidFill>
@@ -8501,14 +8596,14 @@
               <a:buChar char="●"/>
             </a:pPr>
             <a:r>
-              <a:rPr lang="en">
+              <a:rPr lang="en" dirty="0">
                 <a:solidFill>
                   <a:schemeClr val="dk1"/>
                 </a:solidFill>
               </a:rPr>
-              <a:t>Score extensions by weighting frequency of blocked trackers with prominence of website (inverse of Alexa Top 50 rank)</a:t>
+              <a:t>Score extensions by weighting frequency of blocked trackers with prominence of website (inverse of Alexa Top 50 rank) [1]</a:t>
             </a:r>
-            <a:endParaRPr>
+            <a:endParaRPr dirty="0">
               <a:solidFill>
                 <a:schemeClr val="dk1"/>
               </a:solidFill>
@@ -8529,14 +8624,14 @@
               <a:buChar char="●"/>
             </a:pPr>
             <a:r>
-              <a:rPr lang="en">
+              <a:rPr lang="en" dirty="0">
                 <a:solidFill>
                   <a:schemeClr val="dk1"/>
                 </a:solidFill>
               </a:rPr>
               <a:t>Emphasis on blocking pervasive trackers that appear on popular sites</a:t>
             </a:r>
-            <a:endParaRPr>
+            <a:endParaRPr dirty="0">
               <a:solidFill>
                 <a:schemeClr val="dk1"/>
               </a:solidFill>
@@ -8945,14 +9040,14 @@
               <a:buChar char="●"/>
             </a:pPr>
             <a:r>
-              <a:rPr lang="en">
+              <a:rPr lang="en" dirty="0">
                 <a:solidFill>
                   <a:schemeClr val="dk1"/>
                 </a:solidFill>
               </a:rPr>
               <a:t>Ghostery performed very well (confirmed with earlier research) [1]</a:t>
             </a:r>
-            <a:endParaRPr>
+            <a:endParaRPr dirty="0">
               <a:solidFill>
                 <a:schemeClr val="dk1"/>
               </a:solidFill>
@@ -8973,14 +9068,14 @@
               <a:buChar char="●"/>
             </a:pPr>
             <a:r>
-              <a:rPr lang="en">
+              <a:rPr lang="en" dirty="0">
                 <a:solidFill>
                   <a:schemeClr val="dk1"/>
                 </a:solidFill>
               </a:rPr>
               <a:t>PrivacyBadger blocks large volume of (obscure) trackers</a:t>
             </a:r>
-            <a:endParaRPr>
+            <a:endParaRPr dirty="0">
               <a:solidFill>
                 <a:schemeClr val="dk1"/>
               </a:solidFill>
@@ -9001,14 +9096,14 @@
               <a:buChar char="○"/>
             </a:pPr>
             <a:r>
-              <a:rPr lang="en">
+              <a:rPr lang="en" dirty="0">
                 <a:solidFill>
                   <a:schemeClr val="dk1"/>
                 </a:solidFill>
               </a:rPr>
               <a:t>Falls short by failing to block some of more prevalent trackers</a:t>
             </a:r>
-            <a:endParaRPr>
+            <a:endParaRPr dirty="0">
               <a:solidFill>
                 <a:schemeClr val="dk1"/>
               </a:solidFill>
@@ -9029,14 +9124,14 @@
               <a:buChar char="●"/>
             </a:pPr>
             <a:r>
-              <a:rPr lang="en">
+              <a:rPr lang="en" dirty="0">
                 <a:solidFill>
                   <a:schemeClr val="dk1"/>
                 </a:solidFill>
               </a:rPr>
               <a:t>uBlock Origin best according to our new metric</a:t>
             </a:r>
-            <a:endParaRPr>
+            <a:endParaRPr dirty="0">
               <a:solidFill>
                 <a:schemeClr val="dk1"/>
               </a:solidFill>
@@ -9057,14 +9152,14 @@
               <a:buChar char="○"/>
             </a:pPr>
             <a:r>
-              <a:rPr lang="en">
+              <a:rPr lang="en" dirty="0">
                 <a:solidFill>
                   <a:schemeClr val="dk1"/>
                 </a:solidFill>
               </a:rPr>
               <a:t>Blocked same pervasive trackers as Ghostery and more obscure trackers like PrivacyBadger</a:t>
             </a:r>
-            <a:endParaRPr>
+            <a:endParaRPr dirty="0">
               <a:solidFill>
                 <a:schemeClr val="dk1"/>
               </a:solidFill>
@@ -9085,14 +9180,14 @@
               <a:buChar char="●"/>
             </a:pPr>
             <a:r>
-              <a:rPr lang="en">
+              <a:rPr lang="en" dirty="0">
                 <a:solidFill>
                   <a:schemeClr val="dk1"/>
                 </a:solidFill>
               </a:rPr>
               <a:t>Firefox’s built in privacy performed poorly</a:t>
             </a:r>
-            <a:endParaRPr>
+            <a:endParaRPr dirty="0">
               <a:solidFill>
                 <a:schemeClr val="dk1"/>
               </a:solidFill>
@@ -9113,14 +9208,14 @@
               <a:buChar char="○"/>
             </a:pPr>
             <a:r>
-              <a:rPr lang="en">
+              <a:rPr lang="en" dirty="0">
                 <a:solidFill>
                   <a:schemeClr val="dk1"/>
                 </a:solidFill>
               </a:rPr>
               <a:t>Captured small portion of total trackers regardless of prevalence</a:t>
             </a:r>
-            <a:endParaRPr>
+            <a:endParaRPr dirty="0">
               <a:solidFill>
                 <a:schemeClr val="dk1"/>
               </a:solidFill>
@@ -9136,7 +9231,7 @@
         </p:nvGraphicFramePr>
         <p:xfrm>
           <a:off x="5457100" y="3131725"/>
-          <a:ext cx="3000000" cy="3000000"/>
+          <a:ext cx="3605575" cy="1981050"/>
         </p:xfrm>
         <a:graphic>
           <a:graphicData uri="http://schemas.openxmlformats.org/drawingml/2006/table">

</xml_diff>